<commit_message>
Updated DataLoad to use .last()
</commit_message>
<xml_diff>
--- a/Presentation.pptx
+++ b/Presentation.pptx
@@ -149,7 +149,7 @@
 <file path=ppt/revisionInfo.xml><?xml version="1.0" encoding="utf-8"?>
 <p1510:revInfo xmlns:a="http://schemas.openxmlformats.org/drawingml/2006/main" xmlns:r="http://schemas.openxmlformats.org/officeDocument/2006/relationships" xmlns:p1510="http://schemas.microsoft.com/office/powerpoint/2015/10/main">
   <p1510:revLst>
-    <p1510:client id="{246B2FC1-71B6-4E7D-A6F0-E7B013C9520E}" v="54" dt="2023-06-10T18:33:44.697"/>
+    <p1510:client id="{246B2FC1-71B6-4E7D-A6F0-E7B013C9520E}" v="55" dt="2023-06-10T18:44:10.636"/>
   </p1510:revLst>
 </p1510:revInfo>
 </file>
@@ -159,7 +159,7 @@
   <pc:docChgLst>
     <pc:chgData name="Jamie Mellway" userId="64a32afde6b9d889" providerId="LiveId" clId="{246B2FC1-71B6-4E7D-A6F0-E7B013C9520E}"/>
     <pc:docChg chg="undo custSel addSld delSld modSld sldOrd">
-      <pc:chgData name="Jamie Mellway" userId="64a32afde6b9d889" providerId="LiveId" clId="{246B2FC1-71B6-4E7D-A6F0-E7B013C9520E}" dt="2023-06-10T18:33:50.661" v="1378" actId="1076"/>
+      <pc:chgData name="Jamie Mellway" userId="64a32afde6b9d889" providerId="LiveId" clId="{246B2FC1-71B6-4E7D-A6F0-E7B013C9520E}" dt="2023-06-10T18:44:13.007" v="1391" actId="1076"/>
       <pc:docMkLst>
         <pc:docMk/>
       </pc:docMkLst>
@@ -715,7 +715,7 @@
         </pc:picChg>
       </pc:sldChg>
       <pc:sldChg chg="addSp delSp modSp add mod">
-        <pc:chgData name="Jamie Mellway" userId="64a32afde6b9d889" providerId="LiveId" clId="{246B2FC1-71B6-4E7D-A6F0-E7B013C9520E}" dt="2023-06-10T18:20:29.681" v="1173" actId="1076"/>
+        <pc:chgData name="Jamie Mellway" userId="64a32afde6b9d889" providerId="LiveId" clId="{246B2FC1-71B6-4E7D-A6F0-E7B013C9520E}" dt="2023-06-10T18:44:13.007" v="1391" actId="1076"/>
         <pc:sldMkLst>
           <pc:docMk/>
           <pc:sldMk cId="2141782774" sldId="365"/>
@@ -744,6 +744,14 @@
             <ac:spMk id="5" creationId="{412FA927-9B52-D89D-C010-9DBEF8CA3E1C}"/>
           </ac:spMkLst>
         </pc:spChg>
+        <pc:picChg chg="add mod">
+          <ac:chgData name="Jamie Mellway" userId="64a32afde6b9d889" providerId="LiveId" clId="{246B2FC1-71B6-4E7D-A6F0-E7B013C9520E}" dt="2023-06-10T18:44:13.007" v="1391" actId="1076"/>
+          <ac:picMkLst>
+            <pc:docMk/>
+            <pc:sldMk cId="2141782774" sldId="365"/>
+            <ac:picMk id="4" creationId="{7C6B4202-7F9C-5782-13EE-7DB93BCC39FB}"/>
+          </ac:picMkLst>
+        </pc:picChg>
         <pc:picChg chg="del">
           <ac:chgData name="Jamie Mellway" userId="64a32afde6b9d889" providerId="LiveId" clId="{246B2FC1-71B6-4E7D-A6F0-E7B013C9520E}" dt="2023-06-10T18:16:28.443" v="1129" actId="478"/>
           <ac:picMkLst>
@@ -752,8 +760,8 @@
             <ac:picMk id="7" creationId="{16BF8FEA-C6D2-B758-4119-3B148EBB3A2A}"/>
           </ac:picMkLst>
         </pc:picChg>
-        <pc:picChg chg="add mod">
-          <ac:chgData name="Jamie Mellway" userId="64a32afde6b9d889" providerId="LiveId" clId="{246B2FC1-71B6-4E7D-A6F0-E7B013C9520E}" dt="2023-06-10T18:20:29.681" v="1173" actId="1076"/>
+        <pc:picChg chg="add del mod">
+          <ac:chgData name="Jamie Mellway" userId="64a32afde6b9d889" providerId="LiveId" clId="{246B2FC1-71B6-4E7D-A6F0-E7B013C9520E}" dt="2023-06-10T18:44:04.280" v="1387" actId="478"/>
           <ac:picMkLst>
             <pc:docMk/>
             <pc:sldMk cId="2141782774" sldId="365"/>
@@ -762,7 +770,7 @@
         </pc:picChg>
       </pc:sldChg>
       <pc:sldChg chg="modSp add mod ord">
-        <pc:chgData name="Jamie Mellway" userId="64a32afde6b9d889" providerId="LiveId" clId="{246B2FC1-71B6-4E7D-A6F0-E7B013C9520E}" dt="2023-06-10T18:24:41.514" v="1224" actId="20577"/>
+        <pc:chgData name="Jamie Mellway" userId="64a32afde6b9d889" providerId="LiveId" clId="{246B2FC1-71B6-4E7D-A6F0-E7B013C9520E}" dt="2023-06-10T18:43:01.598" v="1386" actId="20577"/>
         <pc:sldMkLst>
           <pc:docMk/>
           <pc:sldMk cId="2373737168" sldId="366"/>
@@ -773,6 +781,14 @@
             <pc:docMk/>
             <pc:sldMk cId="2373737168" sldId="366"/>
             <ac:spMk id="2" creationId="{D735F7F3-C1B5-4B60-A00A-4EB618DDFB5A}"/>
+          </ac:spMkLst>
+        </pc:spChg>
+        <pc:spChg chg="mod">
+          <ac:chgData name="Jamie Mellway" userId="64a32afde6b9d889" providerId="LiveId" clId="{246B2FC1-71B6-4E7D-A6F0-E7B013C9520E}" dt="2023-06-10T18:43:01.598" v="1386" actId="20577"/>
+          <ac:spMkLst>
+            <pc:docMk/>
+            <pc:sldMk cId="2373737168" sldId="366"/>
+            <ac:spMk id="18" creationId="{F4A80293-40FF-9778-A37E-C352DDB48812}"/>
           </ac:spMkLst>
         </pc:spChg>
       </pc:sldChg>
@@ -10092,10 +10108,10 @@
       </p:sp>
       <p:pic>
         <p:nvPicPr>
-          <p:cNvPr id="8" name="Picture 7" descr="A picture containing text, line, screenshot, diagram&#10;&#10;Description automatically generated">
+          <p:cNvPr id="4" name="Picture 3" descr="A picture containing text, line, screenshot, diagram&#10;&#10;Description automatically generated">
             <a:extLst>
               <a:ext uri="{FF2B5EF4-FFF2-40B4-BE49-F238E27FC236}">
-                <a16:creationId xmlns:a16="http://schemas.microsoft.com/office/drawing/2014/main" id="{447A3388-3FD2-78B1-0C96-0D116ABD5872}"/>
+                <a16:creationId xmlns:a16="http://schemas.microsoft.com/office/drawing/2014/main" id="{7C6B4202-7F9C-5782-13EE-7DB93BCC39FB}"/>
               </a:ext>
             </a:extLst>
           </p:cNvPr>
@@ -11671,6 +11687,16 @@
             </a:pPr>
             <a:r>
               <a:rPr lang="en-CA" dirty="0"/>
+              <a:t>iShares Global Timber &amp; Forestry ETF (WOOD-Q)</a:t>
+            </a:r>
+          </a:p>
+          <a:p>
+            <a:pPr marL="285750" indent="-285750">
+              <a:buFont typeface="Arial" panose="020B0604020202020204" pitchFamily="34" charset="0"/>
+              <a:buChar char="•"/>
+            </a:pPr>
+            <a:r>
+              <a:rPr lang="en-CA" dirty="0"/>
               <a:t>SPDR S&amp;P Homebuilders ETF (XHB)</a:t>
             </a:r>
           </a:p>
@@ -11682,16 +11708,6 @@
             <a:r>
               <a:rPr lang="en-CA" dirty="0"/>
               <a:t>iShares U.S. Home Construction ETF (IBT)</a:t>
-            </a:r>
-          </a:p>
-          <a:p>
-            <a:pPr marL="285750" indent="-285750">
-              <a:buFont typeface="Arial" panose="020B0604020202020204" pitchFamily="34" charset="0"/>
-              <a:buChar char="•"/>
-            </a:pPr>
-            <a:r>
-              <a:rPr lang="en-CA" dirty="0"/>
-              <a:t>iShares Global Timber &amp; Forestry ETF (WOOD-Q)</a:t>
             </a:r>
           </a:p>
           <a:p>
@@ -11776,7 +11792,7 @@
             </a:pPr>
             <a:r>
               <a:rPr lang="en-CA" dirty="0"/>
-              <a:t>Data was only when the rate changed.  There could be multiple changes per month, so we needed to group by month using the maximum value.  There was missing months where the rate hadn’t changed, so we needed to forward fill.</a:t>
+              <a:t>Data was only when the rate changed.  There could be multiple changes per month, so we needed to group by month using the last value.  There was missing months where the rate hadn’t changed, so we needed to forward fill.</a:t>
             </a:r>
           </a:p>
           <a:p>

</xml_diff>